<commit_message>
added first day lecture slides and adjusted notes
</commit_message>
<xml_diff>
--- a/Lecture_Slides/src/lecure_slides_01.21.2021.pptx
+++ b/Lecture_Slides/src/lecure_slides_01.21.2021.pptx
@@ -6,6 +6,8 @@
   </p:sldMasterIdLst>
   <p:sldIdLst>
     <p:sldId id="256" r:id="rId2"/>
+    <p:sldId id="257" r:id="rId3"/>
+    <p:sldId id="258" r:id="rId4"/>
   </p:sldIdLst>
   <p:sldSz cx="12192000" cy="6858000"/>
   <p:notesSz cx="6858000" cy="9144000"/>
@@ -104,6 +106,11 @@
       </a:defRPr>
     </a:lvl9pPr>
   </p:defaultTextStyle>
+  <p:extLst>
+    <p:ext uri="{EFAFB233-063F-42B5-8137-9DF3F51BA10A}">
+      <p15:sldGuideLst xmlns:p15="http://schemas.microsoft.com/office/powerpoint/2012/main"/>
+    </p:ext>
+  </p:extLst>
 </p:presentation>
 </file>
 
@@ -3390,6 +3397,317 @@
 </p:sld>
 </file>
 
+<file path=ppt/slides/slide2.xml><?xml version="1.0" encoding="utf-8"?>
+<p:sld xmlns:a="http://schemas.openxmlformats.org/drawingml/2006/main" xmlns:r="http://schemas.openxmlformats.org/officeDocument/2006/relationships" xmlns:p="http://schemas.openxmlformats.org/presentationml/2006/main">
+  <p:cSld>
+    <p:spTree>
+      <p:nvGrpSpPr>
+        <p:cNvPr id="1" name=""/>
+        <p:cNvGrpSpPr/>
+        <p:nvPr/>
+      </p:nvGrpSpPr>
+      <p:grpSpPr>
+        <a:xfrm>
+          <a:off x="0" y="0"/>
+          <a:ext cx="0" cy="0"/>
+          <a:chOff x="0" y="0"/>
+          <a:chExt cx="0" cy="0"/>
+        </a:xfrm>
+      </p:grpSpPr>
+      <p:sp>
+        <p:nvSpPr>
+          <p:cNvPr id="2" name="Title 1">
+            <a:extLst>
+              <a:ext uri="{FF2B5EF4-FFF2-40B4-BE49-F238E27FC236}">
+                <a16:creationId xmlns:a16="http://schemas.microsoft.com/office/drawing/2014/main" id="{4AC58345-7FC8-6B48-B1E5-AA5F0BACA642}"/>
+              </a:ext>
+            </a:extLst>
+          </p:cNvPr>
+          <p:cNvSpPr>
+            <a:spLocks noGrp="1"/>
+          </p:cNvSpPr>
+          <p:nvPr>
+            <p:ph type="title"/>
+          </p:nvPr>
+        </p:nvSpPr>
+        <p:spPr/>
+        <p:txBody>
+          <a:bodyPr/>
+          <a:lstStyle/>
+          <a:p>
+            <a:r>
+              <a:rPr lang="en-US" dirty="0"/>
+              <a:t>Today’s agenda (from class “notes”)</a:t>
+            </a:r>
+          </a:p>
+        </p:txBody>
+      </p:sp>
+      <p:sp>
+        <p:nvSpPr>
+          <p:cNvPr id="3" name="Content Placeholder 2">
+            <a:extLst>
+              <a:ext uri="{FF2B5EF4-FFF2-40B4-BE49-F238E27FC236}">
+                <a16:creationId xmlns:a16="http://schemas.microsoft.com/office/drawing/2014/main" id="{733F26A6-BA31-AE45-B218-09BF754A8BC0}"/>
+              </a:ext>
+            </a:extLst>
+          </p:cNvPr>
+          <p:cNvSpPr>
+            <a:spLocks noGrp="1"/>
+          </p:cNvSpPr>
+          <p:nvPr>
+            <p:ph idx="1"/>
+          </p:nvPr>
+        </p:nvSpPr>
+        <p:spPr/>
+        <p:txBody>
+          <a:bodyPr/>
+          <a:lstStyle/>
+          <a:p>
+            <a:pPr marL="514350" indent="-514350">
+              <a:buFont typeface="+mj-lt"/>
+              <a:buAutoNum type="arabicPeriod"/>
+            </a:pPr>
+            <a:r>
+              <a:rPr lang="en-US" dirty="0"/>
+              <a:t>Introductions (in groups)</a:t>
+            </a:r>
+          </a:p>
+          <a:p>
+            <a:pPr marL="514350" indent="-514350">
+              <a:buFont typeface="+mj-lt"/>
+              <a:buAutoNum type="arabicPeriod"/>
+            </a:pPr>
+            <a:r>
+              <a:rPr lang="en-US" dirty="0"/>
+              <a:t>Pre-class questionnaire and discussion</a:t>
+            </a:r>
+          </a:p>
+          <a:p>
+            <a:pPr marL="514350" indent="-514350">
+              <a:buFont typeface="+mj-lt"/>
+              <a:buAutoNum type="arabicPeriod"/>
+            </a:pPr>
+            <a:r>
+              <a:rPr lang="en-US" dirty="0"/>
+              <a:t>Course structure, goals, and [syllabus](../Syllabus)</a:t>
+            </a:r>
+          </a:p>
+          <a:p>
+            <a:pPr marL="514350" indent="-514350">
+              <a:buFont typeface="+mj-lt"/>
+              <a:buAutoNum type="arabicPeriod"/>
+            </a:pPr>
+            <a:r>
+              <a:rPr lang="en-US" dirty="0"/>
+              <a:t>Discussion of semester outlook</a:t>
+            </a:r>
+          </a:p>
+          <a:p>
+            <a:pPr marL="514350" indent="-514350">
+              <a:buFont typeface="+mj-lt"/>
+              <a:buAutoNum type="arabicPeriod"/>
+            </a:pPr>
+            <a:r>
+              <a:rPr lang="en-US" dirty="0"/>
+              <a:t>Course website (https://</a:t>
+            </a:r>
+            <a:r>
+              <a:rPr lang="en-US" dirty="0" err="1"/>
+              <a:t>github.com</a:t>
+            </a:r>
+            <a:r>
+              <a:rPr lang="en-US" dirty="0"/>
+              <a:t>/</a:t>
+            </a:r>
+            <a:r>
+              <a:rPr lang="en-US" dirty="0" err="1"/>
+              <a:t>SmithEcophysLab</a:t>
+            </a:r>
+            <a:r>
+              <a:rPr lang="en-US" dirty="0"/>
+              <a:t>/ecophys_sp2021)</a:t>
+            </a:r>
+          </a:p>
+          <a:p>
+            <a:pPr marL="514350" indent="-514350">
+              <a:buFont typeface="+mj-lt"/>
+              <a:buAutoNum type="arabicPeriod"/>
+            </a:pPr>
+            <a:r>
+              <a:rPr lang="en-US" dirty="0"/>
+              <a:t>Finding and reading scientific literature</a:t>
+            </a:r>
+          </a:p>
+        </p:txBody>
+      </p:sp>
+    </p:spTree>
+    <p:extLst>
+      <p:ext uri="{BB962C8B-B14F-4D97-AF65-F5344CB8AC3E}">
+        <p14:creationId xmlns:p14="http://schemas.microsoft.com/office/powerpoint/2010/main" val="3003270792"/>
+      </p:ext>
+    </p:extLst>
+  </p:cSld>
+  <p:clrMapOvr>
+    <a:masterClrMapping/>
+  </p:clrMapOvr>
+</p:sld>
+</file>
+
+<file path=ppt/slides/slide3.xml><?xml version="1.0" encoding="utf-8"?>
+<p:sld xmlns:a="http://schemas.openxmlformats.org/drawingml/2006/main" xmlns:r="http://schemas.openxmlformats.org/officeDocument/2006/relationships" xmlns:p="http://schemas.openxmlformats.org/presentationml/2006/main">
+  <p:cSld>
+    <p:spTree>
+      <p:nvGrpSpPr>
+        <p:cNvPr id="1" name=""/>
+        <p:cNvGrpSpPr/>
+        <p:nvPr/>
+      </p:nvGrpSpPr>
+      <p:grpSpPr>
+        <a:xfrm>
+          <a:off x="0" y="0"/>
+          <a:ext cx="0" cy="0"/>
+          <a:chOff x="0" y="0"/>
+          <a:chExt cx="0" cy="0"/>
+        </a:xfrm>
+      </p:grpSpPr>
+      <p:sp>
+        <p:nvSpPr>
+          <p:cNvPr id="2" name="Title 1">
+            <a:extLst>
+              <a:ext uri="{FF2B5EF4-FFF2-40B4-BE49-F238E27FC236}">
+                <a16:creationId xmlns:a16="http://schemas.microsoft.com/office/drawing/2014/main" id="{FB004058-A001-DB40-B971-B0A299EB81F7}"/>
+              </a:ext>
+            </a:extLst>
+          </p:cNvPr>
+          <p:cNvSpPr>
+            <a:spLocks noGrp="1"/>
+          </p:cNvSpPr>
+          <p:nvPr>
+            <p:ph type="title"/>
+          </p:nvPr>
+        </p:nvSpPr>
+        <p:spPr/>
+        <p:txBody>
+          <a:bodyPr/>
+          <a:lstStyle/>
+          <a:p>
+            <a:r>
+              <a:rPr lang="en-US" dirty="0"/>
+              <a:t>Homework (from class “notes”)</a:t>
+            </a:r>
+          </a:p>
+        </p:txBody>
+      </p:sp>
+      <p:sp>
+        <p:nvSpPr>
+          <p:cNvPr id="3" name="Content Placeholder 2">
+            <a:extLst>
+              <a:ext uri="{FF2B5EF4-FFF2-40B4-BE49-F238E27FC236}">
+                <a16:creationId xmlns:a16="http://schemas.microsoft.com/office/drawing/2014/main" id="{DC0EC2CF-17B7-2D41-9BE2-0113677CCC4D}"/>
+              </a:ext>
+            </a:extLst>
+          </p:cNvPr>
+          <p:cNvSpPr>
+            <a:spLocks noGrp="1"/>
+          </p:cNvSpPr>
+          <p:nvPr>
+            <p:ph idx="1"/>
+          </p:nvPr>
+        </p:nvSpPr>
+        <p:spPr/>
+        <p:txBody>
+          <a:bodyPr>
+            <a:normAutofit fontScale="92500" lnSpcReduction="10000"/>
+          </a:bodyPr>
+          <a:lstStyle/>
+          <a:p>
+            <a:r>
+              <a:rPr lang="en-US" dirty="0"/>
+              <a:t>Navigate to course website and familiarize yourself with the structure.</a:t>
+            </a:r>
+          </a:p>
+          <a:p>
+            <a:pPr lvl="1"/>
+            <a:r>
+              <a:rPr lang="en-US" dirty="0"/>
+              <a:t>Contact Dr. </a:t>
+            </a:r>
+            <a:r>
+              <a:rPr lang="en-US"/>
+              <a:t>Smith </a:t>
+            </a:r>
+            <a:r>
+              <a:rPr lang="en-US" dirty="0"/>
+              <a:t>(</a:t>
+            </a:r>
+            <a:r>
+              <a:rPr lang="en-US" dirty="0" err="1"/>
+              <a:t>nick.smith@ttu.edu</a:t>
+            </a:r>
+            <a:r>
+              <a:rPr lang="en-US" dirty="0"/>
+              <a:t>) if you have any issues.</a:t>
+            </a:r>
+          </a:p>
+          <a:p>
+            <a:r>
+              <a:rPr lang="en-US" dirty="0"/>
+              <a:t>Read over the Syllabus</a:t>
+            </a:r>
+          </a:p>
+          <a:p>
+            <a:r>
+              <a:rPr lang="en-US" dirty="0"/>
+              <a:t>Read Chapin (2003). The full citation and link can be found in the Readings folder</a:t>
+            </a:r>
+          </a:p>
+          <a:p>
+            <a:r>
+              <a:rPr lang="en-US" dirty="0"/>
+              <a:t>Practice searching for scientific literature using Google Scholar and Web of Science (through the TTU libraries)</a:t>
+            </a:r>
+          </a:p>
+          <a:p>
+            <a:r>
+              <a:rPr lang="en-US" dirty="0"/>
+              <a:t>Download book</a:t>
+            </a:r>
+          </a:p>
+          <a:p>
+            <a:pPr lvl="1"/>
+            <a:r>
+              <a:rPr lang="en-US" dirty="0"/>
+              <a:t>Plant Physiological Ecology (2nd Edition; 2008) by Lambers, Chapin, and Pons</a:t>
+            </a:r>
+          </a:p>
+          <a:p>
+            <a:r>
+              <a:rPr lang="en-US" dirty="0"/>
+              <a:t>Buy book (optional)</a:t>
+            </a:r>
+          </a:p>
+          <a:p>
+            <a:pPr lvl="1"/>
+            <a:r>
+              <a:rPr lang="en-US" dirty="0"/>
+              <a:t>Plant Physiology and Development (6th Edition) by Taiz, Ziegler, Moller, and Murphy</a:t>
+            </a:r>
+          </a:p>
+        </p:txBody>
+      </p:sp>
+    </p:spTree>
+    <p:extLst>
+      <p:ext uri="{BB962C8B-B14F-4D97-AF65-F5344CB8AC3E}">
+        <p14:creationId xmlns:p14="http://schemas.microsoft.com/office/powerpoint/2010/main" val="3880109284"/>
+      </p:ext>
+    </p:extLst>
+  </p:cSld>
+  <p:clrMapOvr>
+    <a:masterClrMapping/>
+  </p:clrMapOvr>
+</p:sld>
+</file>
+
 <file path=ppt/theme/theme1.xml><?xml version="1.0" encoding="utf-8"?>
 <a:theme xmlns:a="http://schemas.openxmlformats.org/drawingml/2006/main" name="Office Theme">
   <a:themeElements>

</xml_diff>